<commit_message>
Final PowerPoint presentation and uploaded pictures for report
</commit_message>
<xml_diff>
--- a/Presentation.pptx
+++ b/Presentation.pptx
@@ -126,7 +126,7 @@
 <file path=ppt/revisionInfo.xml><?xml version="1.0" encoding="utf-8"?>
 <p1510:revInfo xmlns:a="http://schemas.openxmlformats.org/drawingml/2006/main" xmlns:r="http://schemas.openxmlformats.org/officeDocument/2006/relationships" xmlns:p1510="http://schemas.microsoft.com/office/powerpoint/2015/10/main">
   <p1510:revLst>
-    <p1510:client id="{89B2CC91-8DD5-4011-B910-922D0BC0F619}" v="93" dt="2025-04-24T21:21:43.693"/>
+    <p1510:client id="{89B2CC91-8DD5-4011-B910-922D0BC0F619}" v="101" dt="2025-04-29T18:35:54.158"/>
   </p1510:revLst>
 </p1510:revInfo>
 </file>
@@ -136,18 +136,18 @@
   <pc:docChgLst>
     <pc:chgData name="Charles-Étienne Lessard" userId="9e7860fe-5f45-44b0-aa38-fe4050d81879" providerId="ADAL" clId="{89B2CC91-8DD5-4011-B910-922D0BC0F619}"/>
     <pc:docChg chg="undo custSel addSld delSld modSld sldOrd">
-      <pc:chgData name="Charles-Étienne Lessard" userId="9e7860fe-5f45-44b0-aa38-fe4050d81879" providerId="ADAL" clId="{89B2CC91-8DD5-4011-B910-922D0BC0F619}" dt="2025-04-24T21:22:08.399" v="5702" actId="255"/>
+      <pc:chgData name="Charles-Étienne Lessard" userId="9e7860fe-5f45-44b0-aa38-fe4050d81879" providerId="ADAL" clId="{89B2CC91-8DD5-4011-B910-922D0BC0F619}" dt="2025-04-29T18:45:22.793" v="5813" actId="1076"/>
       <pc:docMkLst>
         <pc:docMk/>
       </pc:docMkLst>
       <pc:sldChg chg="addSp delSp modSp mod">
-        <pc:chgData name="Charles-Étienne Lessard" userId="9e7860fe-5f45-44b0-aa38-fe4050d81879" providerId="ADAL" clId="{89B2CC91-8DD5-4011-B910-922D0BC0F619}" dt="2025-04-17T18:04:49.643" v="4112" actId="20577"/>
+        <pc:chgData name="Charles-Étienne Lessard" userId="9e7860fe-5f45-44b0-aa38-fe4050d81879" providerId="ADAL" clId="{89B2CC91-8DD5-4011-B910-922D0BC0F619}" dt="2025-04-29T18:45:22.793" v="5813" actId="1076"/>
         <pc:sldMkLst>
           <pc:docMk/>
           <pc:sldMk cId="3574113265" sldId="256"/>
         </pc:sldMkLst>
         <pc:spChg chg="mod">
-          <ac:chgData name="Charles-Étienne Lessard" userId="9e7860fe-5f45-44b0-aa38-fe4050d81879" providerId="ADAL" clId="{89B2CC91-8DD5-4011-B910-922D0BC0F619}" dt="2025-04-15T14:27:56.442" v="2461" actId="790"/>
+          <ac:chgData name="Charles-Étienne Lessard" userId="9e7860fe-5f45-44b0-aa38-fe4050d81879" providerId="ADAL" clId="{89B2CC91-8DD5-4011-B910-922D0BC0F619}" dt="2025-04-29T18:45:22.793" v="5813" actId="1076"/>
           <ac:spMkLst>
             <pc:docMk/>
             <pc:sldMk cId="3574113265" sldId="256"/>
@@ -216,22 +216,6 @@
             <ac:spMk id="25" creationId="{75E8FD9E-27AC-1193-1AB9-D6A46BAECD2A}"/>
           </ac:spMkLst>
         </pc:spChg>
-        <pc:picChg chg="add del">
-          <ac:chgData name="Charles-Étienne Lessard" userId="9e7860fe-5f45-44b0-aa38-fe4050d81879" providerId="ADAL" clId="{89B2CC91-8DD5-4011-B910-922D0BC0F619}" dt="2025-04-24T18:30:20.375" v="5480" actId="21"/>
-          <ac:picMkLst>
-            <pc:docMk/>
-            <pc:sldMk cId="2398544108" sldId="258"/>
-            <ac:picMk id="3" creationId="{B653A3D3-7438-9A9F-3523-AEBD6FA314E9}"/>
-          </ac:picMkLst>
-        </pc:picChg>
-        <pc:picChg chg="del">
-          <ac:chgData name="Charles-Étienne Lessard" userId="9e7860fe-5f45-44b0-aa38-fe4050d81879" providerId="ADAL" clId="{89B2CC91-8DD5-4011-B910-922D0BC0F619}" dt="2025-04-24T18:30:14.726" v="5478" actId="21"/>
-          <ac:picMkLst>
-            <pc:docMk/>
-            <pc:sldMk cId="2398544108" sldId="258"/>
-            <ac:picMk id="5" creationId="{A0E33D38-85EC-9E4A-D9A8-BE6CBCAFD244}"/>
-          </ac:picMkLst>
-        </pc:picChg>
         <pc:picChg chg="add mod">
           <ac:chgData name="Charles-Étienne Lessard" userId="9e7860fe-5f45-44b0-aa38-fe4050d81879" providerId="ADAL" clId="{89B2CC91-8DD5-4011-B910-922D0BC0F619}" dt="2025-04-16T17:10:34.710" v="3036" actId="1076"/>
           <ac:picMkLst>
@@ -491,14 +475,6 @@
             <ac:spMk id="7" creationId="{8D702EC7-F27B-AF53-169B-DA16292A3C1A}"/>
           </ac:spMkLst>
         </pc:spChg>
-        <pc:spChg chg="add del mod">
-          <ac:chgData name="Charles-Étienne Lessard" userId="9e7860fe-5f45-44b0-aa38-fe4050d81879" providerId="ADAL" clId="{89B2CC91-8DD5-4011-B910-922D0BC0F619}" dt="2025-04-24T19:18:41.688" v="5595" actId="21"/>
-          <ac:spMkLst>
-            <pc:docMk/>
-            <pc:sldMk cId="626618653" sldId="263"/>
-            <ac:spMk id="8" creationId="{BDA74255-0AF8-8F78-F625-E0347B6BDA83}"/>
-          </ac:spMkLst>
-        </pc:spChg>
         <pc:picChg chg="add mod">
           <ac:chgData name="Charles-Étienne Lessard" userId="9e7860fe-5f45-44b0-aa38-fe4050d81879" providerId="ADAL" clId="{89B2CC91-8DD5-4011-B910-922D0BC0F619}" dt="2025-04-24T19:18:57.779" v="5600" actId="1076"/>
           <ac:picMkLst>
@@ -531,35 +507,27 @@
             <ac:picMk id="11" creationId="{BFB7208D-D1E7-48E5-6840-2CD3633B581B}"/>
           </ac:picMkLst>
         </pc:picChg>
-        <pc:picChg chg="add del mod">
-          <ac:chgData name="Charles-Étienne Lessard" userId="9e7860fe-5f45-44b0-aa38-fe4050d81879" providerId="ADAL" clId="{89B2CC91-8DD5-4011-B910-922D0BC0F619}" dt="2025-04-24T19:18:34.164" v="5594" actId="21"/>
-          <ac:picMkLst>
-            <pc:docMk/>
-            <pc:sldMk cId="626618653" sldId="263"/>
-            <ac:picMk id="14" creationId="{876EF803-0333-AAE9-03F3-36EEF8D09EFA}"/>
-          </ac:picMkLst>
-        </pc:picChg>
       </pc:sldChg>
       <pc:sldChg chg="addSp delSp modSp new mod ord setBg">
-        <pc:chgData name="Charles-Étienne Lessard" userId="9e7860fe-5f45-44b0-aa38-fe4050d81879" providerId="ADAL" clId="{89B2CC91-8DD5-4011-B910-922D0BC0F619}" dt="2025-04-24T21:22:08.399" v="5702" actId="255"/>
+        <pc:chgData name="Charles-Étienne Lessard" userId="9e7860fe-5f45-44b0-aa38-fe4050d81879" providerId="ADAL" clId="{89B2CC91-8DD5-4011-B910-922D0BC0F619}" dt="2025-04-29T18:34:32.328" v="5715" actId="20577"/>
         <pc:sldMkLst>
           <pc:docMk/>
           <pc:sldMk cId="2182131301" sldId="264"/>
         </pc:sldMkLst>
         <pc:spChg chg="mod">
-          <ac:chgData name="Charles-Étienne Lessard" userId="9e7860fe-5f45-44b0-aa38-fe4050d81879" providerId="ADAL" clId="{89B2CC91-8DD5-4011-B910-922D0BC0F619}" dt="2025-04-24T21:22:08.399" v="5702" actId="255"/>
+          <ac:chgData name="Charles-Étienne Lessard" userId="9e7860fe-5f45-44b0-aa38-fe4050d81879" providerId="ADAL" clId="{89B2CC91-8DD5-4011-B910-922D0BC0F619}" dt="2025-04-29T18:33:39.638" v="5711" actId="20577"/>
           <ac:spMkLst>
             <pc:docMk/>
             <pc:sldMk cId="2182131301" sldId="264"/>
             <ac:spMk id="2" creationId="{438120C0-684B-3085-3C94-ADE560429605}"/>
           </ac:spMkLst>
         </pc:spChg>
-        <pc:spChg chg="del mod">
-          <ac:chgData name="Charles-Étienne Lessard" userId="9e7860fe-5f45-44b0-aa38-fe4050d81879" providerId="ADAL" clId="{89B2CC91-8DD5-4011-B910-922D0BC0F619}" dt="2025-04-24T21:21:26.494" v="5697"/>
+        <pc:spChg chg="add mod">
+          <ac:chgData name="Charles-Étienne Lessard" userId="9e7860fe-5f45-44b0-aa38-fe4050d81879" providerId="ADAL" clId="{89B2CC91-8DD5-4011-B910-922D0BC0F619}" dt="2025-04-29T18:34:32.328" v="5715" actId="20577"/>
           <ac:spMkLst>
             <pc:docMk/>
             <pc:sldMk cId="2182131301" sldId="264"/>
-            <ac:spMk id="3" creationId="{7F61671C-CA40-E8AD-78DF-3253058EC013}"/>
+            <ac:spMk id="3" creationId="{4D214154-AF07-1BAF-DCD1-DA6341FCDE59}"/>
           </ac:spMkLst>
         </pc:spChg>
         <pc:spChg chg="add">
@@ -672,7 +640,7 @@
         </pc:sldMkLst>
       </pc:sldChg>
       <pc:sldChg chg="addSp delSp modSp new mod ord setBg setClrOvrMap">
-        <pc:chgData name="Charles-Étienne Lessard" userId="9e7860fe-5f45-44b0-aa38-fe4050d81879" providerId="ADAL" clId="{89B2CC91-8DD5-4011-B910-922D0BC0F619}" dt="2025-04-24T20:31:02.541" v="5663" actId="20577"/>
+        <pc:chgData name="Charles-Étienne Lessard" userId="9e7860fe-5f45-44b0-aa38-fe4050d81879" providerId="ADAL" clId="{89B2CC91-8DD5-4011-B910-922D0BC0F619}" dt="2025-04-28T23:39:43.411" v="5706" actId="20578"/>
         <pc:sldMkLst>
           <pc:docMk/>
           <pc:sldMk cId="1958922506" sldId="268"/>
@@ -686,7 +654,7 @@
           </ac:spMkLst>
         </pc:spChg>
         <pc:spChg chg="mod">
-          <ac:chgData name="Charles-Étienne Lessard" userId="9e7860fe-5f45-44b0-aa38-fe4050d81879" providerId="ADAL" clId="{89B2CC91-8DD5-4011-B910-922D0BC0F619}" dt="2025-04-24T20:31:02.541" v="5663" actId="20577"/>
+          <ac:chgData name="Charles-Étienne Lessard" userId="9e7860fe-5f45-44b0-aa38-fe4050d81879" providerId="ADAL" clId="{89B2CC91-8DD5-4011-B910-922D0BC0F619}" dt="2025-04-28T23:39:43.411" v="5706" actId="20578"/>
           <ac:spMkLst>
             <pc:docMk/>
             <pc:sldMk cId="1958922506" sldId="268"/>
@@ -922,7 +890,7 @@
           <a:p>
             <a:fld id="{ED291B17-9318-49DB-B28B-6E5994AE9581}" type="datetime1">
               <a:rPr lang="en-US" smtClean="0"/>
-              <a:t>4/24/2025</a:t>
+              <a:t>4/29/2025</a:t>
             </a:fld>
             <a:endParaRPr lang="en-US" dirty="0"/>
           </a:p>
@@ -1121,7 +1089,7 @@
           <a:p>
             <a:fld id="{ED291B17-9318-49DB-B28B-6E5994AE9581}" type="datetime1">
               <a:rPr lang="en-US" smtClean="0"/>
-              <a:t>4/24/2025</a:t>
+              <a:t>4/29/2025</a:t>
             </a:fld>
             <a:endParaRPr lang="en-US" dirty="0"/>
           </a:p>
@@ -1330,7 +1298,7 @@
           <a:p>
             <a:fld id="{ED291B17-9318-49DB-B28B-6E5994AE9581}" type="datetime1">
               <a:rPr lang="en-US" smtClean="0"/>
-              <a:t>4/24/2025</a:t>
+              <a:t>4/29/2025</a:t>
             </a:fld>
             <a:endParaRPr lang="en-US" dirty="0"/>
           </a:p>
@@ -1529,7 +1497,7 @@
           <a:p>
             <a:fld id="{ED291B17-9318-49DB-B28B-6E5994AE9581}" type="datetime1">
               <a:rPr lang="en-US" smtClean="0"/>
-              <a:t>4/24/2025</a:t>
+              <a:t>4/29/2025</a:t>
             </a:fld>
             <a:endParaRPr lang="en-US" dirty="0"/>
           </a:p>
@@ -1805,7 +1773,7 @@
           <a:p>
             <a:fld id="{ED291B17-9318-49DB-B28B-6E5994AE9581}" type="datetime1">
               <a:rPr lang="en-US" smtClean="0"/>
-              <a:t>4/24/2025</a:t>
+              <a:t>4/29/2025</a:t>
             </a:fld>
             <a:endParaRPr lang="en-US" dirty="0"/>
           </a:p>
@@ -2071,7 +2039,7 @@
           <a:p>
             <a:fld id="{ED291B17-9318-49DB-B28B-6E5994AE9581}" type="datetime1">
               <a:rPr lang="en-US" smtClean="0"/>
-              <a:t>4/24/2025</a:t>
+              <a:t>4/29/2025</a:t>
             </a:fld>
             <a:endParaRPr lang="en-US" dirty="0"/>
           </a:p>
@@ -2484,7 +2452,7 @@
           <a:p>
             <a:fld id="{ED291B17-9318-49DB-B28B-6E5994AE9581}" type="datetime1">
               <a:rPr lang="en-US" smtClean="0"/>
-              <a:t>4/24/2025</a:t>
+              <a:t>4/29/2025</a:t>
             </a:fld>
             <a:endParaRPr lang="en-US" dirty="0"/>
           </a:p>
@@ -2626,7 +2594,7 @@
           <a:p>
             <a:fld id="{ED291B17-9318-49DB-B28B-6E5994AE9581}" type="datetime1">
               <a:rPr lang="en-US" smtClean="0"/>
-              <a:t>4/24/2025</a:t>
+              <a:t>4/29/2025</a:t>
             </a:fld>
             <a:endParaRPr lang="en-US" dirty="0"/>
           </a:p>
@@ -2740,7 +2708,7 @@
           <a:p>
             <a:fld id="{ED291B17-9318-49DB-B28B-6E5994AE9581}" type="datetime1">
               <a:rPr lang="en-US" smtClean="0"/>
-              <a:t>4/24/2025</a:t>
+              <a:t>4/29/2025</a:t>
             </a:fld>
             <a:endParaRPr lang="en-US" dirty="0"/>
           </a:p>
@@ -3052,7 +3020,7 @@
           <a:p>
             <a:fld id="{ED291B17-9318-49DB-B28B-6E5994AE9581}" type="datetime1">
               <a:rPr lang="en-US" smtClean="0"/>
-              <a:t>4/24/2025</a:t>
+              <a:t>4/29/2025</a:t>
             </a:fld>
             <a:endParaRPr lang="en-US" dirty="0"/>
           </a:p>
@@ -3341,7 +3309,7 @@
           <a:p>
             <a:fld id="{ED291B17-9318-49DB-B28B-6E5994AE9581}" type="datetime1">
               <a:rPr lang="en-US" smtClean="0"/>
-              <a:t>4/24/2025</a:t>
+              <a:t>4/29/2025</a:t>
             </a:fld>
             <a:endParaRPr lang="en-US" dirty="0"/>
           </a:p>
@@ -3583,7 +3551,7 @@
           <a:p>
             <a:fld id="{ED291B17-9318-49DB-B28B-6E5994AE9581}" type="datetime1">
               <a:rPr lang="en-US" smtClean="0"/>
-              <a:t>4/24/2025</a:t>
+              <a:t>4/29/2025</a:t>
             </a:fld>
             <a:endParaRPr lang="en-US" dirty="0"/>
           </a:p>
@@ -4422,8 +4390,8 @@
         </p:nvSpPr>
         <p:spPr>
           <a:xfrm>
-            <a:off x="489098" y="1106034"/>
-            <a:ext cx="5019074" cy="3204134"/>
+            <a:off x="489097" y="905403"/>
+            <a:ext cx="5429921" cy="3204134"/>
           </a:xfrm>
         </p:spPr>
         <p:txBody>
@@ -4432,11 +4400,29 @@
           </a:bodyPr>
           <a:lstStyle/>
           <a:p>
-            <a:pPr algn="l"/>
-            <a:r>
-              <a:rPr lang="en-CA" sz="5400" noProof="0"/>
-              <a:t>DRP 2025</a:t>
-            </a:r>
+            <a:pPr algn="l">
+              <a:spcBef>
+                <a:spcPts val="1800"/>
+              </a:spcBef>
+              <a:spcAft>
+                <a:spcPts val="1800"/>
+              </a:spcAft>
+            </a:pPr>
+            <a:r>
+              <a:rPr lang="en-CA" sz="4000" dirty="0"/>
+              <a:t>Symmetry Breaking in Particle Simulations:</a:t>
+            </a:r>
+            <a:br>
+              <a:rPr lang="en-CA" sz="4000" dirty="0"/>
+            </a:br>
+            <a:br>
+              <a:rPr lang="en-CA" sz="4000" dirty="0"/>
+            </a:br>
+            <a:r>
+              <a:rPr lang="en-CA" sz="4000" dirty="0"/>
+              <a:t>A Computational Exploration</a:t>
+            </a:r>
+            <a:endParaRPr lang="en-CA" sz="4000" noProof="0" dirty="0"/>
           </a:p>
         </p:txBody>
       </p:sp>
@@ -8768,10 +8754,6 @@
               <a:rPr lang="en-US" sz="3200" noProof="0" dirty="0"/>
               <a:t> of the minimizers?</a:t>
             </a:r>
-            <a:br>
-              <a:rPr lang="en-US" sz="3200" noProof="0" dirty="0"/>
-            </a:br>
-            <a:endParaRPr lang="en-US" sz="3200" noProof="0" dirty="0"/>
           </a:p>
         </p:txBody>
       </p:sp>
@@ -9240,6 +9222,44 @@
           </a:prstGeom>
         </p:spPr>
       </p:pic>
+      <p:sp>
+        <p:nvSpPr>
+          <p:cNvPr id="3" name="ZoneTexte 2">
+            <a:extLst>
+              <a:ext uri="{FF2B5EF4-FFF2-40B4-BE49-F238E27FC236}">
+                <a16:creationId xmlns:a16="http://schemas.microsoft.com/office/drawing/2014/main" id="{4D214154-AF07-1BAF-DCD1-DA6341FCDE59}"/>
+              </a:ext>
+            </a:extLst>
+          </p:cNvPr>
+          <p:cNvSpPr txBox="1"/>
+          <p:nvPr/>
+        </p:nvSpPr>
+        <p:spPr>
+          <a:xfrm>
+            <a:off x="393902" y="1818376"/>
+            <a:ext cx="5151492" cy="369332"/>
+          </a:xfrm>
+          <a:prstGeom prst="rect">
+            <a:avLst/>
+          </a:prstGeom>
+          <a:noFill/>
+        </p:spPr>
+        <p:txBody>
+          <a:bodyPr wrap="square" rtlCol="0">
+            <a:spAutoFit/>
+          </a:bodyPr>
+          <a:lstStyle/>
+          <a:p>
+            <a:r>
+              <a:rPr lang="fr-CA" dirty="0">
+                <a:hlinkClick r:id="rId5"/>
+              </a:rPr>
+              <a:t>Julia Notebook</a:t>
+            </a:r>
+            <a:endParaRPr lang="fr-CA" dirty="0"/>
+          </a:p>
+        </p:txBody>
+      </p:sp>
     </p:spTree>
     <p:extLst>
       <p:ext uri="{BB962C8B-B14F-4D97-AF65-F5344CB8AC3E}">

</xml_diff>

<commit_message>
Updated README and Folder Containing the Images Used for the Report
</commit_message>
<xml_diff>
--- a/Presentation.pptx
+++ b/Presentation.pptx
@@ -126,7 +126,7 @@
 <file path=ppt/revisionInfo.xml><?xml version="1.0" encoding="utf-8"?>
 <p1510:revInfo xmlns:a="http://schemas.openxmlformats.org/drawingml/2006/main" xmlns:r="http://schemas.openxmlformats.org/officeDocument/2006/relationships" xmlns:p1510="http://schemas.microsoft.com/office/powerpoint/2015/10/main">
   <p1510:revLst>
-    <p1510:client id="{89B2CC91-8DD5-4011-B910-922D0BC0F619}" v="101" dt="2025-04-29T18:35:54.158"/>
+    <p1510:client id="{89B2CC91-8DD5-4011-B910-922D0BC0F619}" v="106" dt="2025-05-15T17:59:52.931"/>
   </p1510:revLst>
 </p1510:revInfo>
 </file>
@@ -136,7 +136,7 @@
   <pc:docChgLst>
     <pc:chgData name="Charles-Étienne Lessard" userId="9e7860fe-5f45-44b0-aa38-fe4050d81879" providerId="ADAL" clId="{89B2CC91-8DD5-4011-B910-922D0BC0F619}"/>
     <pc:docChg chg="undo custSel addSld delSld modSld sldOrd">
-      <pc:chgData name="Charles-Étienne Lessard" userId="9e7860fe-5f45-44b0-aa38-fe4050d81879" providerId="ADAL" clId="{89B2CC91-8DD5-4011-B910-922D0BC0F619}" dt="2025-04-29T18:45:22.793" v="5813" actId="1076"/>
+      <pc:chgData name="Charles-Étienne Lessard" userId="9e7860fe-5f45-44b0-aa38-fe4050d81879" providerId="ADAL" clId="{89B2CC91-8DD5-4011-B910-922D0BC0F619}" dt="2025-05-20T21:23:06.119" v="5933" actId="2696"/>
       <pc:docMkLst>
         <pc:docMk/>
       </pc:docMkLst>
@@ -738,6 +738,13 @@
           <pc:sldMk cId="4252641214" sldId="269"/>
         </pc:sldMkLst>
       </pc:sldChg>
+      <pc:sldChg chg="addSp delSp modSp add del mod">
+        <pc:chgData name="Charles-Étienne Lessard" userId="9e7860fe-5f45-44b0-aa38-fe4050d81879" providerId="ADAL" clId="{89B2CC91-8DD5-4011-B910-922D0BC0F619}" dt="2025-05-20T21:23:06.119" v="5933" actId="2696"/>
+        <pc:sldMkLst>
+          <pc:docMk/>
+          <pc:sldMk cId="3616524586" sldId="270"/>
+        </pc:sldMkLst>
+      </pc:sldChg>
     </pc:docChg>
   </pc:docChgLst>
 </pc:chgInfo>
@@ -890,7 +897,7 @@
           <a:p>
             <a:fld id="{ED291B17-9318-49DB-B28B-6E5994AE9581}" type="datetime1">
               <a:rPr lang="en-US" smtClean="0"/>
-              <a:t>4/29/2025</a:t>
+              <a:t>5/20/2025</a:t>
             </a:fld>
             <a:endParaRPr lang="en-US" dirty="0"/>
           </a:p>
@@ -1089,7 +1096,7 @@
           <a:p>
             <a:fld id="{ED291B17-9318-49DB-B28B-6E5994AE9581}" type="datetime1">
               <a:rPr lang="en-US" smtClean="0"/>
-              <a:t>4/29/2025</a:t>
+              <a:t>5/20/2025</a:t>
             </a:fld>
             <a:endParaRPr lang="en-US" dirty="0"/>
           </a:p>
@@ -1298,7 +1305,7 @@
           <a:p>
             <a:fld id="{ED291B17-9318-49DB-B28B-6E5994AE9581}" type="datetime1">
               <a:rPr lang="en-US" smtClean="0"/>
-              <a:t>4/29/2025</a:t>
+              <a:t>5/20/2025</a:t>
             </a:fld>
             <a:endParaRPr lang="en-US" dirty="0"/>
           </a:p>
@@ -1497,7 +1504,7 @@
           <a:p>
             <a:fld id="{ED291B17-9318-49DB-B28B-6E5994AE9581}" type="datetime1">
               <a:rPr lang="en-US" smtClean="0"/>
-              <a:t>4/29/2025</a:t>
+              <a:t>5/20/2025</a:t>
             </a:fld>
             <a:endParaRPr lang="en-US" dirty="0"/>
           </a:p>
@@ -1773,7 +1780,7 @@
           <a:p>
             <a:fld id="{ED291B17-9318-49DB-B28B-6E5994AE9581}" type="datetime1">
               <a:rPr lang="en-US" smtClean="0"/>
-              <a:t>4/29/2025</a:t>
+              <a:t>5/20/2025</a:t>
             </a:fld>
             <a:endParaRPr lang="en-US" dirty="0"/>
           </a:p>
@@ -2039,7 +2046,7 @@
           <a:p>
             <a:fld id="{ED291B17-9318-49DB-B28B-6E5994AE9581}" type="datetime1">
               <a:rPr lang="en-US" smtClean="0"/>
-              <a:t>4/29/2025</a:t>
+              <a:t>5/20/2025</a:t>
             </a:fld>
             <a:endParaRPr lang="en-US" dirty="0"/>
           </a:p>
@@ -2452,7 +2459,7 @@
           <a:p>
             <a:fld id="{ED291B17-9318-49DB-B28B-6E5994AE9581}" type="datetime1">
               <a:rPr lang="en-US" smtClean="0"/>
-              <a:t>4/29/2025</a:t>
+              <a:t>5/20/2025</a:t>
             </a:fld>
             <a:endParaRPr lang="en-US" dirty="0"/>
           </a:p>
@@ -2594,7 +2601,7 @@
           <a:p>
             <a:fld id="{ED291B17-9318-49DB-B28B-6E5994AE9581}" type="datetime1">
               <a:rPr lang="en-US" smtClean="0"/>
-              <a:t>4/29/2025</a:t>
+              <a:t>5/20/2025</a:t>
             </a:fld>
             <a:endParaRPr lang="en-US" dirty="0"/>
           </a:p>
@@ -2708,7 +2715,7 @@
           <a:p>
             <a:fld id="{ED291B17-9318-49DB-B28B-6E5994AE9581}" type="datetime1">
               <a:rPr lang="en-US" smtClean="0"/>
-              <a:t>4/29/2025</a:t>
+              <a:t>5/20/2025</a:t>
             </a:fld>
             <a:endParaRPr lang="en-US" dirty="0"/>
           </a:p>
@@ -3020,7 +3027,7 @@
           <a:p>
             <a:fld id="{ED291B17-9318-49DB-B28B-6E5994AE9581}" type="datetime1">
               <a:rPr lang="en-US" smtClean="0"/>
-              <a:t>4/29/2025</a:t>
+              <a:t>5/20/2025</a:t>
             </a:fld>
             <a:endParaRPr lang="en-US" dirty="0"/>
           </a:p>
@@ -3309,7 +3316,7 @@
           <a:p>
             <a:fld id="{ED291B17-9318-49DB-B28B-6E5994AE9581}" type="datetime1">
               <a:rPr lang="en-US" smtClean="0"/>
-              <a:t>4/29/2025</a:t>
+              <a:t>5/20/2025</a:t>
             </a:fld>
             <a:endParaRPr lang="en-US" dirty="0"/>
           </a:p>
@@ -3551,7 +3558,7 @@
           <a:p>
             <a:fld id="{ED291B17-9318-49DB-B28B-6E5994AE9581}" type="datetime1">
               <a:rPr lang="en-US" smtClean="0"/>
-              <a:t>4/29/2025</a:t>
+              <a:t>5/20/2025</a:t>
             </a:fld>
             <a:endParaRPr lang="en-US" dirty="0"/>
           </a:p>

</xml_diff>